<commit_message>
Upload buoi 2-3 javacoban
</commit_message>
<xml_diff>
--- a/hocbe/tai-lieu/be/Bai1-LamQuenVoiJava.pptx
+++ b/hocbe/tai-lieu/be/Bai1-LamQuenVoiJava.pptx
@@ -347,7 +347,7 @@
           <a:p>
             <a:fld id="{7109C2E1-7128-4CF3-932E-985565988C28}" type="datetimeFigureOut">
               <a:rPr lang="en-US" smtClean="0"/>
-              <a:t>11/29/2021</a:t>
+              <a:t>12/5/2021</a:t>
             </a:fld>
             <a:endParaRPr lang="en-US"/>
           </a:p>
@@ -515,7 +515,7 @@
           <a:p>
             <a:fld id="{7109C2E1-7128-4CF3-932E-985565988C28}" type="datetimeFigureOut">
               <a:rPr lang="en-US" smtClean="0"/>
-              <a:t>11/29/2021</a:t>
+              <a:t>12/5/2021</a:t>
             </a:fld>
             <a:endParaRPr lang="en-US"/>
           </a:p>
@@ -693,7 +693,7 @@
           <a:p>
             <a:fld id="{7109C2E1-7128-4CF3-932E-985565988C28}" type="datetimeFigureOut">
               <a:rPr lang="en-US" smtClean="0"/>
-              <a:t>11/29/2021</a:t>
+              <a:t>12/5/2021</a:t>
             </a:fld>
             <a:endParaRPr lang="en-US"/>
           </a:p>
@@ -861,7 +861,7 @@
           <a:p>
             <a:fld id="{7109C2E1-7128-4CF3-932E-985565988C28}" type="datetimeFigureOut">
               <a:rPr lang="en-US" smtClean="0"/>
-              <a:t>11/29/2021</a:t>
+              <a:t>12/5/2021</a:t>
             </a:fld>
             <a:endParaRPr lang="en-US"/>
           </a:p>
@@ -1106,7 +1106,7 @@
           <a:p>
             <a:fld id="{7109C2E1-7128-4CF3-932E-985565988C28}" type="datetimeFigureOut">
               <a:rPr lang="en-US" smtClean="0"/>
-              <a:t>11/29/2021</a:t>
+              <a:t>12/5/2021</a:t>
             </a:fld>
             <a:endParaRPr lang="en-US"/>
           </a:p>
@@ -1391,7 +1391,7 @@
           <a:p>
             <a:fld id="{7109C2E1-7128-4CF3-932E-985565988C28}" type="datetimeFigureOut">
               <a:rPr lang="en-US" smtClean="0"/>
-              <a:t>11/29/2021</a:t>
+              <a:t>12/5/2021</a:t>
             </a:fld>
             <a:endParaRPr lang="en-US"/>
           </a:p>
@@ -1810,7 +1810,7 @@
           <a:p>
             <a:fld id="{7109C2E1-7128-4CF3-932E-985565988C28}" type="datetimeFigureOut">
               <a:rPr lang="en-US" smtClean="0"/>
-              <a:t>11/29/2021</a:t>
+              <a:t>12/5/2021</a:t>
             </a:fld>
             <a:endParaRPr lang="en-US"/>
           </a:p>
@@ -1927,7 +1927,7 @@
           <a:p>
             <a:fld id="{7109C2E1-7128-4CF3-932E-985565988C28}" type="datetimeFigureOut">
               <a:rPr lang="en-US" smtClean="0"/>
-              <a:t>11/29/2021</a:t>
+              <a:t>12/5/2021</a:t>
             </a:fld>
             <a:endParaRPr lang="en-US"/>
           </a:p>
@@ -2022,7 +2022,7 @@
           <a:p>
             <a:fld id="{7109C2E1-7128-4CF3-932E-985565988C28}" type="datetimeFigureOut">
               <a:rPr lang="en-US" smtClean="0"/>
-              <a:t>11/29/2021</a:t>
+              <a:t>12/5/2021</a:t>
             </a:fld>
             <a:endParaRPr lang="en-US"/>
           </a:p>
@@ -2297,7 +2297,7 @@
           <a:p>
             <a:fld id="{7109C2E1-7128-4CF3-932E-985565988C28}" type="datetimeFigureOut">
               <a:rPr lang="en-US" smtClean="0"/>
-              <a:t>11/29/2021</a:t>
+              <a:t>12/5/2021</a:t>
             </a:fld>
             <a:endParaRPr lang="en-US"/>
           </a:p>
@@ -2549,7 +2549,7 @@
           <a:p>
             <a:fld id="{7109C2E1-7128-4CF3-932E-985565988C28}" type="datetimeFigureOut">
               <a:rPr lang="en-US" smtClean="0"/>
-              <a:t>11/29/2021</a:t>
+              <a:t>12/5/2021</a:t>
             </a:fld>
             <a:endParaRPr lang="en-US"/>
           </a:p>
@@ -2760,7 +2760,7 @@
           <a:p>
             <a:fld id="{7109C2E1-7128-4CF3-932E-985565988C28}" type="datetimeFigureOut">
               <a:rPr lang="en-US" smtClean="0"/>
-              <a:t>11/29/2021</a:t>
+              <a:t>12/5/2021</a:t>
             </a:fld>
             <a:endParaRPr lang="en-US"/>
           </a:p>
@@ -8981,7 +8981,7 @@
         <p:spPr>
           <a:xfrm>
             <a:off x="23734" y="1539590"/>
-            <a:ext cx="8586866" cy="461665"/>
+            <a:ext cx="8586866" cy="1200329"/>
           </a:xfrm>
           <a:prstGeom prst="rect">
             <a:avLst/>
@@ -8994,14 +8994,275 @@
           <a:lstStyle/>
           <a:p>
             <a:r>
-              <a:rPr lang="en-US" sz="2400" b="1">
-                <a:solidFill>
-                  <a:srgbClr val="FF0000"/>
-                </a:solidFill>
-                <a:latin typeface="Arial" panose="020B0604020202020204" pitchFamily="34" charset="0"/>
-                <a:cs typeface="Arial" panose="020B0604020202020204" pitchFamily="34" charset="0"/>
-              </a:rPr>
-              <a:t>Bài toán giải phương trình bậc nhất Y = aX + b?</a:t>
+              <a:rPr lang="en-US" sz="2400" b="1" dirty="0" err="1">
+                <a:solidFill>
+                  <a:srgbClr val="FF0000"/>
+                </a:solidFill>
+                <a:latin typeface="Arial" panose="020B0604020202020204" pitchFamily="34" charset="0"/>
+                <a:cs typeface="Arial" panose="020B0604020202020204" pitchFamily="34" charset="0"/>
+              </a:rPr>
+              <a:t>Bài</a:t>
+            </a:r>
+            <a:r>
+              <a:rPr lang="en-US" sz="2400" b="1" dirty="0">
+                <a:solidFill>
+                  <a:srgbClr val="FF0000"/>
+                </a:solidFill>
+                <a:latin typeface="Arial" panose="020B0604020202020204" pitchFamily="34" charset="0"/>
+                <a:cs typeface="Arial" panose="020B0604020202020204" pitchFamily="34" charset="0"/>
+              </a:rPr>
+              <a:t> </a:t>
+            </a:r>
+            <a:r>
+              <a:rPr lang="en-US" sz="2400" b="1" dirty="0" err="1">
+                <a:solidFill>
+                  <a:srgbClr val="FF0000"/>
+                </a:solidFill>
+                <a:latin typeface="Arial" panose="020B0604020202020204" pitchFamily="34" charset="0"/>
+                <a:cs typeface="Arial" panose="020B0604020202020204" pitchFamily="34" charset="0"/>
+              </a:rPr>
+              <a:t>toán</a:t>
+            </a:r>
+            <a:r>
+              <a:rPr lang="en-US" sz="2400" b="1" dirty="0">
+                <a:solidFill>
+                  <a:srgbClr val="FF0000"/>
+                </a:solidFill>
+                <a:latin typeface="Arial" panose="020B0604020202020204" pitchFamily="34" charset="0"/>
+                <a:cs typeface="Arial" panose="020B0604020202020204" pitchFamily="34" charset="0"/>
+              </a:rPr>
+              <a:t> </a:t>
+            </a:r>
+            <a:r>
+              <a:rPr lang="en-US" sz="2400" b="1" dirty="0" err="1">
+                <a:solidFill>
+                  <a:srgbClr val="FF0000"/>
+                </a:solidFill>
+                <a:latin typeface="Arial" panose="020B0604020202020204" pitchFamily="34" charset="0"/>
+                <a:cs typeface="Arial" panose="020B0604020202020204" pitchFamily="34" charset="0"/>
+              </a:rPr>
+              <a:t>giải</a:t>
+            </a:r>
+            <a:r>
+              <a:rPr lang="en-US" sz="2400" b="1" dirty="0">
+                <a:solidFill>
+                  <a:srgbClr val="FF0000"/>
+                </a:solidFill>
+                <a:latin typeface="Arial" panose="020B0604020202020204" pitchFamily="34" charset="0"/>
+                <a:cs typeface="Arial" panose="020B0604020202020204" pitchFamily="34" charset="0"/>
+              </a:rPr>
+              <a:t> </a:t>
+            </a:r>
+            <a:r>
+              <a:rPr lang="en-US" sz="2400" b="1" dirty="0" err="1">
+                <a:solidFill>
+                  <a:srgbClr val="FF0000"/>
+                </a:solidFill>
+                <a:latin typeface="Arial" panose="020B0604020202020204" pitchFamily="34" charset="0"/>
+                <a:cs typeface="Arial" panose="020B0604020202020204" pitchFamily="34" charset="0"/>
+              </a:rPr>
+              <a:t>phương</a:t>
+            </a:r>
+            <a:r>
+              <a:rPr lang="en-US" sz="2400" b="1" dirty="0">
+                <a:solidFill>
+                  <a:srgbClr val="FF0000"/>
+                </a:solidFill>
+                <a:latin typeface="Arial" panose="020B0604020202020204" pitchFamily="34" charset="0"/>
+                <a:cs typeface="Arial" panose="020B0604020202020204" pitchFamily="34" charset="0"/>
+              </a:rPr>
+              <a:t> </a:t>
+            </a:r>
+            <a:r>
+              <a:rPr lang="en-US" sz="2400" b="1" dirty="0" err="1">
+                <a:solidFill>
+                  <a:srgbClr val="FF0000"/>
+                </a:solidFill>
+                <a:latin typeface="Arial" panose="020B0604020202020204" pitchFamily="34" charset="0"/>
+                <a:cs typeface="Arial" panose="020B0604020202020204" pitchFamily="34" charset="0"/>
+              </a:rPr>
+              <a:t>trình</a:t>
+            </a:r>
+            <a:r>
+              <a:rPr lang="en-US" sz="2400" b="1" dirty="0">
+                <a:solidFill>
+                  <a:srgbClr val="FF0000"/>
+                </a:solidFill>
+                <a:latin typeface="Arial" panose="020B0604020202020204" pitchFamily="34" charset="0"/>
+                <a:cs typeface="Arial" panose="020B0604020202020204" pitchFamily="34" charset="0"/>
+              </a:rPr>
+              <a:t> </a:t>
+            </a:r>
+            <a:r>
+              <a:rPr lang="en-US" sz="2400" b="1" dirty="0" err="1">
+                <a:solidFill>
+                  <a:srgbClr val="FF0000"/>
+                </a:solidFill>
+                <a:latin typeface="Arial" panose="020B0604020202020204" pitchFamily="34" charset="0"/>
+                <a:cs typeface="Arial" panose="020B0604020202020204" pitchFamily="34" charset="0"/>
+              </a:rPr>
+              <a:t>bậc</a:t>
+            </a:r>
+            <a:r>
+              <a:rPr lang="en-US" sz="2400" b="1" dirty="0">
+                <a:solidFill>
+                  <a:srgbClr val="FF0000"/>
+                </a:solidFill>
+                <a:latin typeface="Arial" panose="020B0604020202020204" pitchFamily="34" charset="0"/>
+                <a:cs typeface="Arial" panose="020B0604020202020204" pitchFamily="34" charset="0"/>
+              </a:rPr>
+              <a:t> </a:t>
+            </a:r>
+            <a:r>
+              <a:rPr lang="en-US" sz="2400" b="1" dirty="0" err="1">
+                <a:solidFill>
+                  <a:srgbClr val="FF0000"/>
+                </a:solidFill>
+                <a:latin typeface="Arial" panose="020B0604020202020204" pitchFamily="34" charset="0"/>
+                <a:cs typeface="Arial" panose="020B0604020202020204" pitchFamily="34" charset="0"/>
+              </a:rPr>
+              <a:t>nhất</a:t>
+            </a:r>
+            <a:r>
+              <a:rPr lang="en-US" sz="2400" b="1" dirty="0">
+                <a:solidFill>
+                  <a:srgbClr val="FF0000"/>
+                </a:solidFill>
+                <a:latin typeface="Arial" panose="020B0604020202020204" pitchFamily="34" charset="0"/>
+                <a:cs typeface="Arial" panose="020B0604020202020204" pitchFamily="34" charset="0"/>
+              </a:rPr>
+              <a:t> Y = </a:t>
+            </a:r>
+            <a:r>
+              <a:rPr lang="en-US" sz="2400" b="1" dirty="0" err="1">
+                <a:solidFill>
+                  <a:srgbClr val="FF0000"/>
+                </a:solidFill>
+                <a:latin typeface="Arial" panose="020B0604020202020204" pitchFamily="34" charset="0"/>
+                <a:cs typeface="Arial" panose="020B0604020202020204" pitchFamily="34" charset="0"/>
+              </a:rPr>
+              <a:t>aX</a:t>
+            </a:r>
+            <a:r>
+              <a:rPr lang="en-US" sz="2400" b="1" dirty="0">
+                <a:solidFill>
+                  <a:srgbClr val="FF0000"/>
+                </a:solidFill>
+                <a:latin typeface="Arial" panose="020B0604020202020204" pitchFamily="34" charset="0"/>
+                <a:cs typeface="Arial" panose="020B0604020202020204" pitchFamily="34" charset="0"/>
+              </a:rPr>
+              <a:t> + b</a:t>
+            </a:r>
+            <a:r>
+              <a:rPr lang="en-US" sz="2400" b="1" dirty="0" smtClean="0">
+                <a:solidFill>
+                  <a:srgbClr val="FF0000"/>
+                </a:solidFill>
+                <a:latin typeface="Arial" panose="020B0604020202020204" pitchFamily="34" charset="0"/>
+                <a:cs typeface="Arial" panose="020B0604020202020204" pitchFamily="34" charset="0"/>
+              </a:rPr>
+              <a:t>?</a:t>
+            </a:r>
+          </a:p>
+          <a:p>
+            <a:endParaRPr lang="en-US" sz="2400" b="1" dirty="0">
+              <a:solidFill>
+                <a:srgbClr val="FF0000"/>
+              </a:solidFill>
+              <a:latin typeface="Arial" panose="020B0604020202020204" pitchFamily="34" charset="0"/>
+              <a:cs typeface="Arial" panose="020B0604020202020204" pitchFamily="34" charset="0"/>
+            </a:endParaRPr>
+          </a:p>
+          <a:p>
+            <a:r>
+              <a:rPr lang="en-US" sz="2400" b="1" dirty="0" smtClean="0">
+                <a:solidFill>
+                  <a:srgbClr val="FF0000"/>
+                </a:solidFill>
+                <a:latin typeface="Arial" panose="020B0604020202020204" pitchFamily="34" charset="0"/>
+                <a:cs typeface="Arial" panose="020B0604020202020204" pitchFamily="34" charset="0"/>
+              </a:rPr>
+              <a:t>Cho </a:t>
+            </a:r>
+            <a:r>
+              <a:rPr lang="en-US" sz="2400" b="1" dirty="0" err="1" smtClean="0">
+                <a:solidFill>
+                  <a:srgbClr val="FF0000"/>
+                </a:solidFill>
+                <a:latin typeface="Arial" panose="020B0604020202020204" pitchFamily="34" charset="0"/>
+                <a:cs typeface="Arial" panose="020B0604020202020204" pitchFamily="34" charset="0"/>
+              </a:rPr>
+              <a:t>phep</a:t>
+            </a:r>
+            <a:r>
+              <a:rPr lang="en-US" sz="2400" b="1" dirty="0" smtClean="0">
+                <a:solidFill>
+                  <a:srgbClr val="FF0000"/>
+                </a:solidFill>
+                <a:latin typeface="Arial" panose="020B0604020202020204" pitchFamily="34" charset="0"/>
+                <a:cs typeface="Arial" panose="020B0604020202020204" pitchFamily="34" charset="0"/>
+              </a:rPr>
+              <a:t> </a:t>
+            </a:r>
+            <a:r>
+              <a:rPr lang="en-US" sz="2400" b="1" dirty="0" err="1" smtClean="0">
+                <a:solidFill>
+                  <a:srgbClr val="FF0000"/>
+                </a:solidFill>
+                <a:latin typeface="Arial" panose="020B0604020202020204" pitchFamily="34" charset="0"/>
+                <a:cs typeface="Arial" panose="020B0604020202020204" pitchFamily="34" charset="0"/>
+              </a:rPr>
+              <a:t>nguoi</a:t>
+            </a:r>
+            <a:r>
+              <a:rPr lang="en-US" sz="2400" b="1" dirty="0" smtClean="0">
+                <a:solidFill>
+                  <a:srgbClr val="FF0000"/>
+                </a:solidFill>
+                <a:latin typeface="Arial" panose="020B0604020202020204" pitchFamily="34" charset="0"/>
+                <a:cs typeface="Arial" panose="020B0604020202020204" pitchFamily="34" charset="0"/>
+              </a:rPr>
+              <a:t> dung </a:t>
+            </a:r>
+            <a:r>
+              <a:rPr lang="en-US" sz="2400" b="1" dirty="0" err="1" smtClean="0">
+                <a:solidFill>
+                  <a:srgbClr val="FF0000"/>
+                </a:solidFill>
+                <a:latin typeface="Arial" panose="020B0604020202020204" pitchFamily="34" charset="0"/>
+                <a:cs typeface="Arial" panose="020B0604020202020204" pitchFamily="34" charset="0"/>
+              </a:rPr>
+              <a:t>nhap</a:t>
+            </a:r>
+            <a:r>
+              <a:rPr lang="en-US" sz="2400" b="1" dirty="0" smtClean="0">
+                <a:solidFill>
+                  <a:srgbClr val="FF0000"/>
+                </a:solidFill>
+                <a:latin typeface="Arial" panose="020B0604020202020204" pitchFamily="34" charset="0"/>
+                <a:cs typeface="Arial" panose="020B0604020202020204" pitchFamily="34" charset="0"/>
+              </a:rPr>
+              <a:t> Y, a, b -&gt; </a:t>
+            </a:r>
+            <a:r>
+              <a:rPr lang="en-US" sz="2400" b="1" dirty="0" err="1" smtClean="0">
+                <a:solidFill>
+                  <a:srgbClr val="FF0000"/>
+                </a:solidFill>
+                <a:latin typeface="Arial" panose="020B0604020202020204" pitchFamily="34" charset="0"/>
+                <a:cs typeface="Arial" panose="020B0604020202020204" pitchFamily="34" charset="0"/>
+              </a:rPr>
+              <a:t>tim</a:t>
+            </a:r>
+            <a:r>
+              <a:rPr lang="en-US" sz="2400" b="1" dirty="0" smtClean="0">
+                <a:solidFill>
+                  <a:srgbClr val="FF0000"/>
+                </a:solidFill>
+                <a:latin typeface="Arial" panose="020B0604020202020204" pitchFamily="34" charset="0"/>
+                <a:cs typeface="Arial" panose="020B0604020202020204" pitchFamily="34" charset="0"/>
+              </a:rPr>
+              <a:t> X</a:t>
             </a:r>
           </a:p>
         </p:txBody>
@@ -9558,7 +9819,7 @@
         <p:spPr>
           <a:xfrm>
             <a:off x="23734" y="1539590"/>
-            <a:ext cx="8586866" cy="830997"/>
+            <a:ext cx="8586866" cy="1569660"/>
           </a:xfrm>
           <a:prstGeom prst="rect">
             <a:avLst/>
@@ -9571,15 +9832,433 @@
           <a:lstStyle/>
           <a:p>
             <a:r>
-              <a:rPr lang="en-US" sz="2400" b="1">
-                <a:solidFill>
-                  <a:srgbClr val="FF0000"/>
-                </a:solidFill>
-                <a:latin typeface="Arial" panose="020B0604020202020204" pitchFamily="34" charset="0"/>
-                <a:cs typeface="Arial" panose="020B0604020202020204" pitchFamily="34" charset="0"/>
-              </a:rPr>
-              <a:t>Nhập vào thông tin một hình chữ nhật và in ra chu vi, diện tích?</a:t>
-            </a:r>
+              <a:rPr lang="en-US" sz="2400" b="1" dirty="0" err="1">
+                <a:solidFill>
+                  <a:srgbClr val="FF0000"/>
+                </a:solidFill>
+                <a:latin typeface="Arial" panose="020B0604020202020204" pitchFamily="34" charset="0"/>
+                <a:cs typeface="Arial" panose="020B0604020202020204" pitchFamily="34" charset="0"/>
+              </a:rPr>
+              <a:t>Nhập</a:t>
+            </a:r>
+            <a:r>
+              <a:rPr lang="en-US" sz="2400" b="1" dirty="0">
+                <a:solidFill>
+                  <a:srgbClr val="FF0000"/>
+                </a:solidFill>
+                <a:latin typeface="Arial" panose="020B0604020202020204" pitchFamily="34" charset="0"/>
+                <a:cs typeface="Arial" panose="020B0604020202020204" pitchFamily="34" charset="0"/>
+              </a:rPr>
+              <a:t> </a:t>
+            </a:r>
+            <a:r>
+              <a:rPr lang="en-US" sz="2400" b="1" dirty="0" err="1">
+                <a:solidFill>
+                  <a:srgbClr val="FF0000"/>
+                </a:solidFill>
+                <a:latin typeface="Arial" panose="020B0604020202020204" pitchFamily="34" charset="0"/>
+                <a:cs typeface="Arial" panose="020B0604020202020204" pitchFamily="34" charset="0"/>
+              </a:rPr>
+              <a:t>vào</a:t>
+            </a:r>
+            <a:r>
+              <a:rPr lang="en-US" sz="2400" b="1" dirty="0">
+                <a:solidFill>
+                  <a:srgbClr val="FF0000"/>
+                </a:solidFill>
+                <a:latin typeface="Arial" panose="020B0604020202020204" pitchFamily="34" charset="0"/>
+                <a:cs typeface="Arial" panose="020B0604020202020204" pitchFamily="34" charset="0"/>
+              </a:rPr>
+              <a:t> </a:t>
+            </a:r>
+            <a:r>
+              <a:rPr lang="en-US" sz="2400" b="1" dirty="0" err="1">
+                <a:solidFill>
+                  <a:srgbClr val="FF0000"/>
+                </a:solidFill>
+                <a:latin typeface="Arial" panose="020B0604020202020204" pitchFamily="34" charset="0"/>
+                <a:cs typeface="Arial" panose="020B0604020202020204" pitchFamily="34" charset="0"/>
+              </a:rPr>
+              <a:t>thông</a:t>
+            </a:r>
+            <a:r>
+              <a:rPr lang="en-US" sz="2400" b="1" dirty="0">
+                <a:solidFill>
+                  <a:srgbClr val="FF0000"/>
+                </a:solidFill>
+                <a:latin typeface="Arial" panose="020B0604020202020204" pitchFamily="34" charset="0"/>
+                <a:cs typeface="Arial" panose="020B0604020202020204" pitchFamily="34" charset="0"/>
+              </a:rPr>
+              <a:t> tin </a:t>
+            </a:r>
+            <a:r>
+              <a:rPr lang="en-US" sz="2400" b="1" dirty="0" err="1">
+                <a:solidFill>
+                  <a:srgbClr val="FF0000"/>
+                </a:solidFill>
+                <a:latin typeface="Arial" panose="020B0604020202020204" pitchFamily="34" charset="0"/>
+                <a:cs typeface="Arial" panose="020B0604020202020204" pitchFamily="34" charset="0"/>
+              </a:rPr>
+              <a:t>một</a:t>
+            </a:r>
+            <a:r>
+              <a:rPr lang="en-US" sz="2400" b="1" dirty="0">
+                <a:solidFill>
+                  <a:srgbClr val="FF0000"/>
+                </a:solidFill>
+                <a:latin typeface="Arial" panose="020B0604020202020204" pitchFamily="34" charset="0"/>
+                <a:cs typeface="Arial" panose="020B0604020202020204" pitchFamily="34" charset="0"/>
+              </a:rPr>
+              <a:t> </a:t>
+            </a:r>
+            <a:r>
+              <a:rPr lang="en-US" sz="2400" b="1" dirty="0" err="1">
+                <a:solidFill>
+                  <a:srgbClr val="FF0000"/>
+                </a:solidFill>
+                <a:latin typeface="Arial" panose="020B0604020202020204" pitchFamily="34" charset="0"/>
+                <a:cs typeface="Arial" panose="020B0604020202020204" pitchFamily="34" charset="0"/>
+              </a:rPr>
+              <a:t>hình</a:t>
+            </a:r>
+            <a:r>
+              <a:rPr lang="en-US" sz="2400" b="1" dirty="0">
+                <a:solidFill>
+                  <a:srgbClr val="FF0000"/>
+                </a:solidFill>
+                <a:latin typeface="Arial" panose="020B0604020202020204" pitchFamily="34" charset="0"/>
+                <a:cs typeface="Arial" panose="020B0604020202020204" pitchFamily="34" charset="0"/>
+              </a:rPr>
+              <a:t> </a:t>
+            </a:r>
+            <a:r>
+              <a:rPr lang="en-US" sz="2400" b="1" dirty="0" err="1">
+                <a:solidFill>
+                  <a:srgbClr val="FF0000"/>
+                </a:solidFill>
+                <a:latin typeface="Arial" panose="020B0604020202020204" pitchFamily="34" charset="0"/>
+                <a:cs typeface="Arial" panose="020B0604020202020204" pitchFamily="34" charset="0"/>
+              </a:rPr>
+              <a:t>chữ</a:t>
+            </a:r>
+            <a:r>
+              <a:rPr lang="en-US" sz="2400" b="1" dirty="0">
+                <a:solidFill>
+                  <a:srgbClr val="FF0000"/>
+                </a:solidFill>
+                <a:latin typeface="Arial" panose="020B0604020202020204" pitchFamily="34" charset="0"/>
+                <a:cs typeface="Arial" panose="020B0604020202020204" pitchFamily="34" charset="0"/>
+              </a:rPr>
+              <a:t> </a:t>
+            </a:r>
+            <a:r>
+              <a:rPr lang="en-US" sz="2400" b="1" dirty="0" err="1">
+                <a:solidFill>
+                  <a:srgbClr val="FF0000"/>
+                </a:solidFill>
+                <a:latin typeface="Arial" panose="020B0604020202020204" pitchFamily="34" charset="0"/>
+                <a:cs typeface="Arial" panose="020B0604020202020204" pitchFamily="34" charset="0"/>
+              </a:rPr>
+              <a:t>nhật</a:t>
+            </a:r>
+            <a:r>
+              <a:rPr lang="en-US" sz="2400" b="1" dirty="0">
+                <a:solidFill>
+                  <a:srgbClr val="FF0000"/>
+                </a:solidFill>
+                <a:latin typeface="Arial" panose="020B0604020202020204" pitchFamily="34" charset="0"/>
+                <a:cs typeface="Arial" panose="020B0604020202020204" pitchFamily="34" charset="0"/>
+              </a:rPr>
+              <a:t> </a:t>
+            </a:r>
+            <a:r>
+              <a:rPr lang="en-US" sz="2400" b="1" dirty="0" err="1">
+                <a:solidFill>
+                  <a:srgbClr val="FF0000"/>
+                </a:solidFill>
+                <a:latin typeface="Arial" panose="020B0604020202020204" pitchFamily="34" charset="0"/>
+                <a:cs typeface="Arial" panose="020B0604020202020204" pitchFamily="34" charset="0"/>
+              </a:rPr>
+              <a:t>và</a:t>
+            </a:r>
+            <a:r>
+              <a:rPr lang="en-US" sz="2400" b="1" dirty="0">
+                <a:solidFill>
+                  <a:srgbClr val="FF0000"/>
+                </a:solidFill>
+                <a:latin typeface="Arial" panose="020B0604020202020204" pitchFamily="34" charset="0"/>
+                <a:cs typeface="Arial" panose="020B0604020202020204" pitchFamily="34" charset="0"/>
+              </a:rPr>
+              <a:t> in </a:t>
+            </a:r>
+            <a:r>
+              <a:rPr lang="en-US" sz="2400" b="1" dirty="0" err="1">
+                <a:solidFill>
+                  <a:srgbClr val="FF0000"/>
+                </a:solidFill>
+                <a:latin typeface="Arial" panose="020B0604020202020204" pitchFamily="34" charset="0"/>
+                <a:cs typeface="Arial" panose="020B0604020202020204" pitchFamily="34" charset="0"/>
+              </a:rPr>
+              <a:t>ra</a:t>
+            </a:r>
+            <a:r>
+              <a:rPr lang="en-US" sz="2400" b="1" dirty="0">
+                <a:solidFill>
+                  <a:srgbClr val="FF0000"/>
+                </a:solidFill>
+                <a:latin typeface="Arial" panose="020B0604020202020204" pitchFamily="34" charset="0"/>
+                <a:cs typeface="Arial" panose="020B0604020202020204" pitchFamily="34" charset="0"/>
+              </a:rPr>
+              <a:t> </a:t>
+            </a:r>
+            <a:r>
+              <a:rPr lang="en-US" sz="2400" b="1" dirty="0" err="1">
+                <a:solidFill>
+                  <a:srgbClr val="FF0000"/>
+                </a:solidFill>
+                <a:latin typeface="Arial" panose="020B0604020202020204" pitchFamily="34" charset="0"/>
+                <a:cs typeface="Arial" panose="020B0604020202020204" pitchFamily="34" charset="0"/>
+              </a:rPr>
+              <a:t>chu</a:t>
+            </a:r>
+            <a:r>
+              <a:rPr lang="en-US" sz="2400" b="1" dirty="0">
+                <a:solidFill>
+                  <a:srgbClr val="FF0000"/>
+                </a:solidFill>
+                <a:latin typeface="Arial" panose="020B0604020202020204" pitchFamily="34" charset="0"/>
+                <a:cs typeface="Arial" panose="020B0604020202020204" pitchFamily="34" charset="0"/>
+              </a:rPr>
+              <a:t> vi, </a:t>
+            </a:r>
+            <a:r>
+              <a:rPr lang="en-US" sz="2400" b="1" dirty="0" err="1">
+                <a:solidFill>
+                  <a:srgbClr val="FF0000"/>
+                </a:solidFill>
+                <a:latin typeface="Arial" panose="020B0604020202020204" pitchFamily="34" charset="0"/>
+                <a:cs typeface="Arial" panose="020B0604020202020204" pitchFamily="34" charset="0"/>
+              </a:rPr>
+              <a:t>diện</a:t>
+            </a:r>
+            <a:r>
+              <a:rPr lang="en-US" sz="2400" b="1" dirty="0">
+                <a:solidFill>
+                  <a:srgbClr val="FF0000"/>
+                </a:solidFill>
+                <a:latin typeface="Arial" panose="020B0604020202020204" pitchFamily="34" charset="0"/>
+                <a:cs typeface="Arial" panose="020B0604020202020204" pitchFamily="34" charset="0"/>
+              </a:rPr>
+              <a:t> </a:t>
+            </a:r>
+            <a:r>
+              <a:rPr lang="en-US" sz="2400" b="1" dirty="0" err="1">
+                <a:solidFill>
+                  <a:srgbClr val="FF0000"/>
+                </a:solidFill>
+                <a:latin typeface="Arial" panose="020B0604020202020204" pitchFamily="34" charset="0"/>
+                <a:cs typeface="Arial" panose="020B0604020202020204" pitchFamily="34" charset="0"/>
+              </a:rPr>
+              <a:t>tích</a:t>
+            </a:r>
+            <a:r>
+              <a:rPr lang="en-US" sz="2400" b="1" dirty="0" smtClean="0">
+                <a:solidFill>
+                  <a:srgbClr val="FF0000"/>
+                </a:solidFill>
+                <a:latin typeface="Arial" panose="020B0604020202020204" pitchFamily="34" charset="0"/>
+                <a:cs typeface="Arial" panose="020B0604020202020204" pitchFamily="34" charset="0"/>
+              </a:rPr>
+              <a:t>?</a:t>
+            </a:r>
+          </a:p>
+          <a:p>
+            <a:endParaRPr lang="en-US" sz="2400" b="1" dirty="0">
+              <a:solidFill>
+                <a:srgbClr val="FF0000"/>
+              </a:solidFill>
+              <a:latin typeface="Arial" panose="020B0604020202020204" pitchFamily="34" charset="0"/>
+              <a:cs typeface="Arial" panose="020B0604020202020204" pitchFamily="34" charset="0"/>
+            </a:endParaRPr>
+          </a:p>
+          <a:p>
+            <a:r>
+              <a:rPr lang="en-US" sz="2400" b="1" dirty="0" smtClean="0">
+                <a:solidFill>
+                  <a:srgbClr val="FF0000"/>
+                </a:solidFill>
+                <a:latin typeface="Arial" panose="020B0604020202020204" pitchFamily="34" charset="0"/>
+                <a:cs typeface="Arial" panose="020B0604020202020204" pitchFamily="34" charset="0"/>
+              </a:rPr>
+              <a:t>Ch</a:t>
+            </a:r>
+            <a:r>
+              <a:rPr lang="en-US" sz="2400" b="1" dirty="0" smtClean="0">
+                <a:solidFill>
+                  <a:srgbClr val="FF0000"/>
+                </a:solidFill>
+                <a:latin typeface="Arial" panose="020B0604020202020204" pitchFamily="34" charset="0"/>
+                <a:cs typeface="Arial" panose="020B0604020202020204" pitchFamily="34" charset="0"/>
+              </a:rPr>
+              <a:t>o </a:t>
+            </a:r>
+            <a:r>
+              <a:rPr lang="en-US" sz="2400" b="1" dirty="0" err="1" smtClean="0">
+                <a:solidFill>
+                  <a:srgbClr val="FF0000"/>
+                </a:solidFill>
+                <a:latin typeface="Arial" panose="020B0604020202020204" pitchFamily="34" charset="0"/>
+                <a:cs typeface="Arial" panose="020B0604020202020204" pitchFamily="34" charset="0"/>
+              </a:rPr>
+              <a:t>nguoi</a:t>
+            </a:r>
+            <a:r>
+              <a:rPr lang="en-US" sz="2400" b="1" dirty="0" smtClean="0">
+                <a:solidFill>
+                  <a:srgbClr val="FF0000"/>
+                </a:solidFill>
+                <a:latin typeface="Arial" panose="020B0604020202020204" pitchFamily="34" charset="0"/>
+                <a:cs typeface="Arial" panose="020B0604020202020204" pitchFamily="34" charset="0"/>
+              </a:rPr>
+              <a:t> dung </a:t>
+            </a:r>
+            <a:r>
+              <a:rPr lang="en-US" sz="2400" b="1" dirty="0" err="1" smtClean="0">
+                <a:solidFill>
+                  <a:srgbClr val="FF0000"/>
+                </a:solidFill>
+                <a:latin typeface="Arial" panose="020B0604020202020204" pitchFamily="34" charset="0"/>
+                <a:cs typeface="Arial" panose="020B0604020202020204" pitchFamily="34" charset="0"/>
+              </a:rPr>
+              <a:t>nhap</a:t>
+            </a:r>
+            <a:r>
+              <a:rPr lang="en-US" sz="2400" b="1" dirty="0" smtClean="0">
+                <a:solidFill>
+                  <a:srgbClr val="FF0000"/>
+                </a:solidFill>
+                <a:latin typeface="Arial" panose="020B0604020202020204" pitchFamily="34" charset="0"/>
+                <a:cs typeface="Arial" panose="020B0604020202020204" pitchFamily="34" charset="0"/>
+              </a:rPr>
+              <a:t> a </a:t>
+            </a:r>
+            <a:r>
+              <a:rPr lang="en-US" sz="2400" b="1" dirty="0" err="1" smtClean="0">
+                <a:solidFill>
+                  <a:srgbClr val="FF0000"/>
+                </a:solidFill>
+                <a:latin typeface="Arial" panose="020B0604020202020204" pitchFamily="34" charset="0"/>
+                <a:cs typeface="Arial" panose="020B0604020202020204" pitchFamily="34" charset="0"/>
+              </a:rPr>
+              <a:t>va</a:t>
+            </a:r>
+            <a:r>
+              <a:rPr lang="en-US" sz="2400" b="1" dirty="0" smtClean="0">
+                <a:solidFill>
+                  <a:srgbClr val="FF0000"/>
+                </a:solidFill>
+                <a:latin typeface="Arial" panose="020B0604020202020204" pitchFamily="34" charset="0"/>
+                <a:cs typeface="Arial" panose="020B0604020202020204" pitchFamily="34" charset="0"/>
+              </a:rPr>
+              <a:t> b -&gt; </a:t>
+            </a:r>
+            <a:r>
+              <a:rPr lang="en-US" sz="2400" b="1" dirty="0" err="1" smtClean="0">
+                <a:solidFill>
+                  <a:srgbClr val="FF0000"/>
+                </a:solidFill>
+                <a:latin typeface="Arial" panose="020B0604020202020204" pitchFamily="34" charset="0"/>
+                <a:cs typeface="Arial" panose="020B0604020202020204" pitchFamily="34" charset="0"/>
+              </a:rPr>
+              <a:t>tim</a:t>
+            </a:r>
+            <a:r>
+              <a:rPr lang="en-US" sz="2400" b="1" dirty="0" smtClean="0">
+                <a:solidFill>
+                  <a:srgbClr val="FF0000"/>
+                </a:solidFill>
+                <a:latin typeface="Arial" panose="020B0604020202020204" pitchFamily="34" charset="0"/>
+                <a:cs typeface="Arial" panose="020B0604020202020204" pitchFamily="34" charset="0"/>
+              </a:rPr>
+              <a:t> </a:t>
+            </a:r>
+            <a:r>
+              <a:rPr lang="en-US" sz="2400" b="1" dirty="0" err="1" smtClean="0">
+                <a:solidFill>
+                  <a:srgbClr val="FF0000"/>
+                </a:solidFill>
+                <a:latin typeface="Arial" panose="020B0604020202020204" pitchFamily="34" charset="0"/>
+                <a:cs typeface="Arial" panose="020B0604020202020204" pitchFamily="34" charset="0"/>
+              </a:rPr>
+              <a:t>chu</a:t>
+            </a:r>
+            <a:r>
+              <a:rPr lang="en-US" sz="2400" b="1" dirty="0" smtClean="0">
+                <a:solidFill>
+                  <a:srgbClr val="FF0000"/>
+                </a:solidFill>
+                <a:latin typeface="Arial" panose="020B0604020202020204" pitchFamily="34" charset="0"/>
+                <a:cs typeface="Arial" panose="020B0604020202020204" pitchFamily="34" charset="0"/>
+              </a:rPr>
+              <a:t> vi </a:t>
+            </a:r>
+            <a:r>
+              <a:rPr lang="en-US" sz="2400" b="1" dirty="0" err="1" smtClean="0">
+                <a:solidFill>
+                  <a:srgbClr val="FF0000"/>
+                </a:solidFill>
+                <a:latin typeface="Arial" panose="020B0604020202020204" pitchFamily="34" charset="0"/>
+                <a:cs typeface="Arial" panose="020B0604020202020204" pitchFamily="34" charset="0"/>
+              </a:rPr>
+              <a:t>va</a:t>
+            </a:r>
+            <a:r>
+              <a:rPr lang="en-US" sz="2400" b="1" dirty="0" smtClean="0">
+                <a:solidFill>
+                  <a:srgbClr val="FF0000"/>
+                </a:solidFill>
+                <a:latin typeface="Arial" panose="020B0604020202020204" pitchFamily="34" charset="0"/>
+                <a:cs typeface="Arial" panose="020B0604020202020204" pitchFamily="34" charset="0"/>
+              </a:rPr>
+              <a:t> </a:t>
+            </a:r>
+            <a:r>
+              <a:rPr lang="en-US" sz="2400" b="1" dirty="0" err="1" smtClean="0">
+                <a:solidFill>
+                  <a:srgbClr val="FF0000"/>
+                </a:solidFill>
+                <a:latin typeface="Arial" panose="020B0604020202020204" pitchFamily="34" charset="0"/>
+                <a:cs typeface="Arial" panose="020B0604020202020204" pitchFamily="34" charset="0"/>
+              </a:rPr>
+              <a:t>dien</a:t>
+            </a:r>
+            <a:r>
+              <a:rPr lang="en-US" sz="2400" b="1" dirty="0" smtClean="0">
+                <a:solidFill>
+                  <a:srgbClr val="FF0000"/>
+                </a:solidFill>
+                <a:latin typeface="Arial" panose="020B0604020202020204" pitchFamily="34" charset="0"/>
+                <a:cs typeface="Arial" panose="020B0604020202020204" pitchFamily="34" charset="0"/>
+              </a:rPr>
+              <a:t> </a:t>
+            </a:r>
+            <a:r>
+              <a:rPr lang="en-US" sz="2400" b="1" dirty="0" err="1" smtClean="0">
+                <a:solidFill>
+                  <a:srgbClr val="FF0000"/>
+                </a:solidFill>
+                <a:latin typeface="Arial" panose="020B0604020202020204" pitchFamily="34" charset="0"/>
+                <a:cs typeface="Arial" panose="020B0604020202020204" pitchFamily="34" charset="0"/>
+              </a:rPr>
+              <a:t>tich</a:t>
+            </a:r>
+            <a:endParaRPr lang="en-US" sz="2400" b="1" dirty="0">
+              <a:solidFill>
+                <a:srgbClr val="FF0000"/>
+              </a:solidFill>
+              <a:latin typeface="Arial" panose="020B0604020202020204" pitchFamily="34" charset="0"/>
+              <a:cs typeface="Arial" panose="020B0604020202020204" pitchFamily="34" charset="0"/>
+            </a:endParaRPr>
           </a:p>
         </p:txBody>
       </p:sp>
@@ -12900,10 +13579,6 @@
               </a:rPr>
               <a:t>https://vietjack.com/java/chuong_trinh_java_dau_tien_hello_world.jsp</a:t>
             </a:r>
-            <a:endParaRPr lang="en-US" dirty="0">
-              <a:latin typeface="Arial" panose="020B0604020202020204" pitchFamily="34" charset="0"/>
-              <a:cs typeface="Arial" panose="020B0604020202020204" pitchFamily="34" charset="0"/>
-            </a:endParaRPr>
           </a:p>
         </p:txBody>
       </p:sp>
@@ -14302,19 +14977,8 @@
                 <a:latin typeface="Arial" panose="020B0604020202020204" pitchFamily="34" charset="0"/>
                 <a:cs typeface="Arial" panose="020B0604020202020204" pitchFamily="34" charset="0"/>
               </a:rPr>
-              <a:t>d</a:t>
-            </a:r>
-            <a:r>
-              <a:rPr lang="en-US">
-                <a:latin typeface="Arial" panose="020B0604020202020204" pitchFamily="34" charset="0"/>
-                <a:cs typeface="Arial" panose="020B0604020202020204" pitchFamily="34" charset="0"/>
-              </a:rPr>
-              <a:t>ouble</a:t>
-            </a:r>
-            <a:endParaRPr lang="en-US" dirty="0">
-              <a:latin typeface="Arial" panose="020B0604020202020204" pitchFamily="34" charset="0"/>
-              <a:cs typeface="Arial" panose="020B0604020202020204" pitchFamily="34" charset="0"/>
-            </a:endParaRPr>
+              <a:t>double</a:t>
+            </a:r>
           </a:p>
         </p:txBody>
       </p:sp>
@@ -15525,7 +16189,7 @@
         <p:spPr>
           <a:xfrm>
             <a:off x="457200" y="2286000"/>
-            <a:ext cx="8305800" cy="3416320"/>
+            <a:ext cx="8305800" cy="3693319"/>
           </a:xfrm>
           <a:prstGeom prst="rect">
             <a:avLst/>
@@ -16938,8 +17602,41 @@
                 <a:latin typeface="Arial" panose="020B0604020202020204" pitchFamily="34" charset="0"/>
                 <a:cs typeface="Arial" panose="020B0604020202020204" pitchFamily="34" charset="0"/>
               </a:rPr>
-              <a:t> static</a:t>
-            </a:r>
+              <a:t> </a:t>
+            </a:r>
+            <a:r>
+              <a:rPr lang="en-US" dirty="0" smtClean="0">
+                <a:solidFill>
+                  <a:srgbClr val="FF0000"/>
+                </a:solidFill>
+                <a:latin typeface="Arial" panose="020B0604020202020204" pitchFamily="34" charset="0"/>
+                <a:cs typeface="Arial" panose="020B0604020202020204" pitchFamily="34" charset="0"/>
+              </a:rPr>
+              <a:t>static</a:t>
+            </a:r>
+          </a:p>
+          <a:p>
+            <a:pPr marL="285750" indent="-285750">
+              <a:buFontTx/>
+              <a:buChar char="-"/>
+            </a:pPr>
+            <a:r>
+              <a:rPr lang="en-US" dirty="0" smtClean="0">
+                <a:solidFill>
+                  <a:srgbClr val="FF0000"/>
+                </a:solidFill>
+                <a:latin typeface="Arial" panose="020B0604020202020204" pitchFamily="34" charset="0"/>
+                <a:cs typeface="Arial" panose="020B0604020202020204" pitchFamily="34" charset="0"/>
+              </a:rPr>
+              <a:t>Bien final</a:t>
+            </a:r>
+            <a:endParaRPr lang="en-US" dirty="0">
+              <a:solidFill>
+                <a:srgbClr val="FF0000"/>
+              </a:solidFill>
+              <a:latin typeface="Arial" panose="020B0604020202020204" pitchFamily="34" charset="0"/>
+              <a:cs typeface="Arial" panose="020B0604020202020204" pitchFamily="34" charset="0"/>
+            </a:endParaRPr>
           </a:p>
         </p:txBody>
       </p:sp>

</xml_diff>

<commit_message>
Update slide Bai1-LamQuenVoiJava.pptx. Upload demo buoi 4 oop.
</commit_message>
<xml_diff>
--- a/hocbe/tai-lieu/be/Bai1-LamQuenVoiJava.pptx
+++ b/hocbe/tai-lieu/be/Bai1-LamQuenVoiJava.pptx
@@ -347,7 +347,7 @@
           <a:p>
             <a:fld id="{7109C2E1-7128-4CF3-932E-985565988C28}" type="datetimeFigureOut">
               <a:rPr lang="en-US" smtClean="0"/>
-              <a:t>12/5/2021</a:t>
+              <a:t>12/8/2021</a:t>
             </a:fld>
             <a:endParaRPr lang="en-US"/>
           </a:p>
@@ -515,7 +515,7 @@
           <a:p>
             <a:fld id="{7109C2E1-7128-4CF3-932E-985565988C28}" type="datetimeFigureOut">
               <a:rPr lang="en-US" smtClean="0"/>
-              <a:t>12/5/2021</a:t>
+              <a:t>12/8/2021</a:t>
             </a:fld>
             <a:endParaRPr lang="en-US"/>
           </a:p>
@@ -693,7 +693,7 @@
           <a:p>
             <a:fld id="{7109C2E1-7128-4CF3-932E-985565988C28}" type="datetimeFigureOut">
               <a:rPr lang="en-US" smtClean="0"/>
-              <a:t>12/5/2021</a:t>
+              <a:t>12/8/2021</a:t>
             </a:fld>
             <a:endParaRPr lang="en-US"/>
           </a:p>
@@ -861,7 +861,7 @@
           <a:p>
             <a:fld id="{7109C2E1-7128-4CF3-932E-985565988C28}" type="datetimeFigureOut">
               <a:rPr lang="en-US" smtClean="0"/>
-              <a:t>12/5/2021</a:t>
+              <a:t>12/8/2021</a:t>
             </a:fld>
             <a:endParaRPr lang="en-US"/>
           </a:p>
@@ -1106,7 +1106,7 @@
           <a:p>
             <a:fld id="{7109C2E1-7128-4CF3-932E-985565988C28}" type="datetimeFigureOut">
               <a:rPr lang="en-US" smtClean="0"/>
-              <a:t>12/5/2021</a:t>
+              <a:t>12/8/2021</a:t>
             </a:fld>
             <a:endParaRPr lang="en-US"/>
           </a:p>
@@ -1391,7 +1391,7 @@
           <a:p>
             <a:fld id="{7109C2E1-7128-4CF3-932E-985565988C28}" type="datetimeFigureOut">
               <a:rPr lang="en-US" smtClean="0"/>
-              <a:t>12/5/2021</a:t>
+              <a:t>12/8/2021</a:t>
             </a:fld>
             <a:endParaRPr lang="en-US"/>
           </a:p>
@@ -1810,7 +1810,7 @@
           <a:p>
             <a:fld id="{7109C2E1-7128-4CF3-932E-985565988C28}" type="datetimeFigureOut">
               <a:rPr lang="en-US" smtClean="0"/>
-              <a:t>12/5/2021</a:t>
+              <a:t>12/8/2021</a:t>
             </a:fld>
             <a:endParaRPr lang="en-US"/>
           </a:p>
@@ -1927,7 +1927,7 @@
           <a:p>
             <a:fld id="{7109C2E1-7128-4CF3-932E-985565988C28}" type="datetimeFigureOut">
               <a:rPr lang="en-US" smtClean="0"/>
-              <a:t>12/5/2021</a:t>
+              <a:t>12/8/2021</a:t>
             </a:fld>
             <a:endParaRPr lang="en-US"/>
           </a:p>
@@ -2022,7 +2022,7 @@
           <a:p>
             <a:fld id="{7109C2E1-7128-4CF3-932E-985565988C28}" type="datetimeFigureOut">
               <a:rPr lang="en-US" smtClean="0"/>
-              <a:t>12/5/2021</a:t>
+              <a:t>12/8/2021</a:t>
             </a:fld>
             <a:endParaRPr lang="en-US"/>
           </a:p>
@@ -2297,7 +2297,7 @@
           <a:p>
             <a:fld id="{7109C2E1-7128-4CF3-932E-985565988C28}" type="datetimeFigureOut">
               <a:rPr lang="en-US" smtClean="0"/>
-              <a:t>12/5/2021</a:t>
+              <a:t>12/8/2021</a:t>
             </a:fld>
             <a:endParaRPr lang="en-US"/>
           </a:p>
@@ -2549,7 +2549,7 @@
           <a:p>
             <a:fld id="{7109C2E1-7128-4CF3-932E-985565988C28}" type="datetimeFigureOut">
               <a:rPr lang="en-US" smtClean="0"/>
-              <a:t>12/5/2021</a:t>
+              <a:t>12/8/2021</a:t>
             </a:fld>
             <a:endParaRPr lang="en-US"/>
           </a:p>
@@ -2760,7 +2760,7 @@
           <a:p>
             <a:fld id="{7109C2E1-7128-4CF3-932E-985565988C28}" type="datetimeFigureOut">
               <a:rPr lang="en-US" smtClean="0"/>
-              <a:t>12/5/2021</a:t>
+              <a:t>12/8/2021</a:t>
             </a:fld>
             <a:endParaRPr lang="en-US"/>
           </a:p>
@@ -10090,17 +10090,7 @@
                 <a:latin typeface="Arial" panose="020B0604020202020204" pitchFamily="34" charset="0"/>
                 <a:cs typeface="Arial" panose="020B0604020202020204" pitchFamily="34" charset="0"/>
               </a:rPr>
-              <a:t>Ch</a:t>
-            </a:r>
-            <a:r>
-              <a:rPr lang="en-US" sz="2400" b="1" dirty="0" smtClean="0">
-                <a:solidFill>
-                  <a:srgbClr val="FF0000"/>
-                </a:solidFill>
-                <a:latin typeface="Arial" panose="020B0604020202020204" pitchFamily="34" charset="0"/>
-                <a:cs typeface="Arial" panose="020B0604020202020204" pitchFamily="34" charset="0"/>
-              </a:rPr>
-              <a:t>o </a:t>
+              <a:t>Cho </a:t>
             </a:r>
             <a:r>
               <a:rPr lang="en-US" sz="2400" b="1" dirty="0" err="1" smtClean="0">
@@ -10823,7 +10813,7 @@
         <p:spPr>
           <a:xfrm>
             <a:off x="23734" y="1539590"/>
-            <a:ext cx="8586866" cy="1200329"/>
+            <a:ext cx="8586866" cy="3046988"/>
           </a:xfrm>
           <a:prstGeom prst="rect">
             <a:avLst/>
@@ -11137,7 +11127,7 @@
               <a:t>dịch</a:t>
             </a:r>
             <a:r>
-              <a:rPr lang="en-US" sz="2400" b="1" dirty="0">
+              <a:rPr lang="en-US" sz="2400" b="1" dirty="0" smtClean="0">
                 <a:solidFill>
                   <a:srgbClr val="FF0000"/>
                 </a:solidFill>
@@ -11146,6 +11136,109 @@
               </a:rPr>
               <a:t>.</a:t>
             </a:r>
+          </a:p>
+          <a:p>
+            <a:endParaRPr lang="en-US" sz="2400" b="1" dirty="0">
+              <a:solidFill>
+                <a:srgbClr val="FF0000"/>
+              </a:solidFill>
+              <a:latin typeface="Arial" panose="020B0604020202020204" pitchFamily="34" charset="0"/>
+              <a:cs typeface="Arial" panose="020B0604020202020204" pitchFamily="34" charset="0"/>
+            </a:endParaRPr>
+          </a:p>
+          <a:p>
+            <a:r>
+              <a:rPr lang="en-US" sz="2400" b="1" dirty="0" smtClean="0">
+                <a:solidFill>
+                  <a:srgbClr val="FF0000"/>
+                </a:solidFill>
+                <a:latin typeface="Arial" panose="020B0604020202020204" pitchFamily="34" charset="0"/>
+                <a:cs typeface="Arial" panose="020B0604020202020204" pitchFamily="34" charset="0"/>
+              </a:rPr>
+              <a:t>The ATM:</a:t>
+            </a:r>
+          </a:p>
+          <a:p>
+            <a:pPr marL="342900" indent="-342900">
+              <a:buFontTx/>
+              <a:buChar char="-"/>
+            </a:pPr>
+            <a:r>
+              <a:rPr lang="en-US" sz="2400" b="1" dirty="0" smtClean="0">
+                <a:solidFill>
+                  <a:srgbClr val="FF0000"/>
+                </a:solidFill>
+                <a:latin typeface="Arial" panose="020B0604020202020204" pitchFamily="34" charset="0"/>
+                <a:cs typeface="Arial" panose="020B0604020202020204" pitchFamily="34" charset="0"/>
+              </a:rPr>
+              <a:t>So the</a:t>
+            </a:r>
+          </a:p>
+          <a:p>
+            <a:pPr marL="342900" indent="-342900">
+              <a:buFontTx/>
+              <a:buChar char="-"/>
+            </a:pPr>
+            <a:r>
+              <a:rPr lang="en-US" sz="2400" b="1" dirty="0" smtClean="0">
+                <a:solidFill>
+                  <a:srgbClr val="FF0000"/>
+                </a:solidFill>
+                <a:latin typeface="Arial" panose="020B0604020202020204" pitchFamily="34" charset="0"/>
+                <a:cs typeface="Arial" panose="020B0604020202020204" pitchFamily="34" charset="0"/>
+              </a:rPr>
+              <a:t>Mat </a:t>
+            </a:r>
+            <a:r>
+              <a:rPr lang="en-US" sz="2400" b="1" dirty="0" err="1" smtClean="0">
+                <a:solidFill>
+                  <a:srgbClr val="FF0000"/>
+                </a:solidFill>
+                <a:latin typeface="Arial" panose="020B0604020202020204" pitchFamily="34" charset="0"/>
+                <a:cs typeface="Arial" panose="020B0604020202020204" pitchFamily="34" charset="0"/>
+              </a:rPr>
+              <a:t>khau</a:t>
+            </a:r>
+            <a:endParaRPr lang="en-US" sz="2400" b="1" dirty="0" smtClean="0">
+              <a:solidFill>
+                <a:srgbClr val="FF0000"/>
+              </a:solidFill>
+              <a:latin typeface="Arial" panose="020B0604020202020204" pitchFamily="34" charset="0"/>
+              <a:cs typeface="Arial" panose="020B0604020202020204" pitchFamily="34" charset="0"/>
+            </a:endParaRPr>
+          </a:p>
+          <a:p>
+            <a:pPr marL="342900" indent="-342900">
+              <a:buFontTx/>
+              <a:buChar char="-"/>
+            </a:pPr>
+            <a:r>
+              <a:rPr lang="en-US" sz="2400" b="1" dirty="0" smtClean="0">
+                <a:solidFill>
+                  <a:srgbClr val="FF0000"/>
+                </a:solidFill>
+                <a:latin typeface="Arial" panose="020B0604020202020204" pitchFamily="34" charset="0"/>
+                <a:cs typeface="Arial" panose="020B0604020202020204" pitchFamily="34" charset="0"/>
+              </a:rPr>
+              <a:t>So du tai </a:t>
+            </a:r>
+            <a:r>
+              <a:rPr lang="en-US" sz="2400" b="1" dirty="0" err="1" smtClean="0">
+                <a:solidFill>
+                  <a:srgbClr val="FF0000"/>
+                </a:solidFill>
+                <a:latin typeface="Arial" panose="020B0604020202020204" pitchFamily="34" charset="0"/>
+                <a:cs typeface="Arial" panose="020B0604020202020204" pitchFamily="34" charset="0"/>
+              </a:rPr>
+              <a:t>khoan</a:t>
+            </a:r>
+            <a:endParaRPr lang="en-US" sz="2400" b="1" dirty="0">
+              <a:solidFill>
+                <a:srgbClr val="FF0000"/>
+              </a:solidFill>
+              <a:latin typeface="Arial" panose="020B0604020202020204" pitchFamily="34" charset="0"/>
+              <a:cs typeface="Arial" panose="020B0604020202020204" pitchFamily="34" charset="0"/>
+            </a:endParaRPr>
           </a:p>
         </p:txBody>
       </p:sp>

</xml_diff>